<commit_message>
add table, chart, media and movie poster to .pptx file. Use LLM to generate pptx content.
</commit_message>
<xml_diff>
--- a/src/outputs/第五次作业.pptx
+++ b/src/outputs/第五次作业.pptx
@@ -17,7 +17,6 @@
     <p:sldId id="259" r:id="rId14"/>
     <p:sldId id="260" r:id="rId15"/>
     <p:sldId id="261" r:id="rId16"/>
-    <p:sldId id="262" r:id="rId17"/>
   </p:sldIdLst>
   <p:sldSz cx="12192000" cy="6858000"/>
   <p:notesSz cx="6858000" cy="9144000"/>
@@ -10546,7 +10545,7 @@
           <a:lstStyle/>
           <a:p>
             <a:r>
-              <a:t>任务概述</a:t>
+              <a:t>使用 python-pptx 自动生成 PowerPoint 文件</a:t>
             </a:r>
           </a:p>
         </p:txBody>
@@ -10569,13 +10568,13 @@
           <a:p>
             <a:pPr/>
             <a:r>
-              <a:t>使用 python-pptx 自动生成 PowerPoint 文件，内容包括文本、图片、表格和图表</a:t>
+              <a:t>使用 python-pptx 包创建演示文稿</a:t>
             </a:r>
           </a:p>
           <a:p>
             <a:pPr/>
             <a:r>
-              <a:t>使用 Gradio 搭建一个 ChatBot 作为图形化用户界面（GUI）</a:t>
+              <a:t>支持文本、图片、表格和图表的插入</a:t>
             </a:r>
           </a:p>
         </p:txBody>
@@ -10614,7 +10613,7 @@
           <a:lstStyle/>
           <a:p>
             <a:r>
-              <a:t>python-pptx 功能</a:t>
+              <a:t>Gradio 搭建 ChatBot</a:t>
             </a:r>
           </a:p>
         </p:txBody>
@@ -10637,13 +10636,13 @@
           <a:p>
             <a:pPr/>
             <a:r>
-              <a:t>自动生成 PowerPoint 文件</a:t>
+              <a:t>构建图形化用户界面</a:t>
             </a:r>
           </a:p>
           <a:p>
             <a:pPr/>
             <a:r>
-              <a:t>支持文本、图片、表格和图表的插入</a:t>
+              <a:t>将用户输入转化为 ChatPPT PowerPoint 输入格式（Markdown）</a:t>
             </a:r>
           </a:p>
         </p:txBody>
@@ -10682,7 +10681,7 @@
           <a:lstStyle/>
           <a:p>
             <a:r>
-              <a:t>ChatBot 功能</a:t>
+              <a:t>ChatBot System Prompt</a:t>
             </a:r>
           </a:p>
         </p:txBody>
@@ -10705,13 +10704,13 @@
           <a:p>
             <a:pPr/>
             <a:r>
-              <a:t>转换用户输入为 ChatPPT PowerPoint 标准输入格式（Markdown）</a:t>
+              <a:t>使用 ChatPPT v0.2 prompts/formatter.txt 文件</a:t>
             </a:r>
           </a:p>
           <a:p>
             <a:pPr/>
             <a:r>
-              <a:t>生成 PowerPoint 文件</a:t>
+              <a:t>鼓励自行创作和优化</a:t>
             </a:r>
           </a:p>
         </p:txBody>
@@ -10750,7 +10749,7 @@
           <a:lstStyle/>
           <a:p>
             <a:r>
-              <a:t>ChatBot 系统提示</a:t>
+              <a:t>整合主流程（可选）</a:t>
             </a:r>
           </a:p>
         </p:txBody>
@@ -10773,13 +10772,13 @@
           <a:p>
             <a:pPr/>
             <a:r>
-              <a:t>使用 ChatPPT v0.2 prompts/formatter.txt 文件</a:t>
+              <a:t>支持聊天输入</a:t>
             </a:r>
           </a:p>
           <a:p>
             <a:pPr/>
             <a:r>
-              <a:t>鼓励自行创作和优化提示内容</a:t>
+              <a:t>自动生成 PowerPoint 文件作为输出</a:t>
             </a:r>
           </a:p>
         </p:txBody>
@@ -10818,7 +10817,7 @@
           <a:lstStyle/>
           <a:p>
             <a:r>
-              <a:t>进阶选项</a:t>
+              <a:t>作业提交方式</a:t>
             </a:r>
           </a:p>
         </p:txBody>
@@ -10841,75 +10840,13 @@
           <a:p>
             <a:pPr/>
             <a:r>
-              <a:t>(可选) 将 ChatBot 生成的 Markdown 和 ChatPPT v0.2 主流程整合</a:t>
+              <a:t>修改代码文件链接复制粘贴至评论框</a:t>
             </a:r>
           </a:p>
           <a:p>
             <a:pPr/>
             <a:r>
-              <a:t>支持聊天输入，自动生成 PowerPoint 文件作为输出</a:t>
-            </a:r>
-          </a:p>
-        </p:txBody>
-      </p:sp>
-    </p:spTree>
-  </p:cSld>
-  <p:clrMapOvr>
-    <a:masterClrMapping/>
-  </p:clrMapOvr>
-</p:sld>
-</file>
-
-<file path=ppt/slides/slide7.xml><?xml version="1.0" encoding="utf-8"?>
-<p:sld xmlns:a="http://schemas.openxmlformats.org/drawingml/2006/main" xmlns:p="http://schemas.openxmlformats.org/presentationml/2006/main" xmlns:r="http://schemas.openxmlformats.org/officeDocument/2006/relationships">
-  <p:cSld>
-    <p:spTree>
-      <p:nvGrpSpPr>
-        <p:cNvPr id="1" name=""/>
-        <p:cNvGrpSpPr/>
-        <p:nvPr/>
-      </p:nvGrpSpPr>
-      <p:grpSpPr/>
-      <p:sp>
-        <p:nvSpPr>
-          <p:cNvPr id="2" name="Title 1"/>
-          <p:cNvSpPr>
-            <a:spLocks noGrp="1"/>
-          </p:cNvSpPr>
-          <p:nvPr>
-            <p:ph type="title"/>
-          </p:nvPr>
-        </p:nvSpPr>
-        <p:spPr/>
-        <p:txBody>
-          <a:bodyPr/>
-          <a:lstStyle/>
-          <a:p>
-            <a:r>
-              <a:t>提交方式</a:t>
-            </a:r>
-          </a:p>
-        </p:txBody>
-      </p:sp>
-      <p:sp>
-        <p:nvSpPr>
-          <p:cNvPr id="3" name="Content Placeholder 2"/>
-          <p:cNvSpPr>
-            <a:spLocks noGrp="1"/>
-          </p:cNvSpPr>
-          <p:nvPr>
-            <p:ph idx="13" sz="quarter"/>
-          </p:nvPr>
-        </p:nvSpPr>
-        <p:spPr/>
-        <p:txBody>
-          <a:bodyPr/>
-          <a:lstStyle/>
-          <a:p/>
-          <a:p>
-            <a:pPr/>
-            <a:r>
-              <a:t>将修改后的代码文件链接复制粘贴至评论框内并提交</a:t>
+              <a:t>点击提交按钮完成作业</a:t>
             </a:r>
           </a:p>
         </p:txBody>

</xml_diff>